<commit_message>
move the UPRI outside the CorePac
</commit_message>
<xml_diff>
--- a/preliminary/Working/presentations/KeyStone_Connectivity_Priority.pptx
+++ b/preliminary/Working/presentations/KeyStone_Connectivity_Priority.pptx
@@ -907,14 +907,14 @@
         <p:spPr>
           <a:extLst>
             <a:ext uri="{909E8E84-426E-40DD-AFC4-6F175D3DCCD1}">
-              <a14:hiddenFill xmlns:a14="http://schemas.microsoft.com/office/drawing/2010/main" xmlns="">
+              <a14:hiddenFill xmlns="" xmlns:a14="http://schemas.microsoft.com/office/drawing/2010/main">
                 <a:solidFill>
                   <a:schemeClr val="accent1"/>
                 </a:solidFill>
               </a14:hiddenFill>
             </a:ext>
             <a:ext uri="{91240B29-F687-4F45-9708-019B960494DF}">
-              <a14:hiddenLine xmlns:a14="http://schemas.microsoft.com/office/drawing/2010/main" xmlns="" w="9525">
+              <a14:hiddenLine xmlns="" xmlns:a14="http://schemas.microsoft.com/office/drawing/2010/main" w="9525">
                 <a:solidFill>
                   <a:schemeClr val="tx1"/>
                 </a:solidFill>
@@ -924,7 +924,7 @@
               </a14:hiddenLine>
             </a:ext>
             <a:ext uri="{AF507438-7753-43E0-B8FC-AC1667EBCBE1}">
-              <a14:hiddenEffects xmlns:a14="http://schemas.microsoft.com/office/drawing/2010/main" xmlns="">
+              <a14:hiddenEffects xmlns="" xmlns:a14="http://schemas.microsoft.com/office/drawing/2010/main">
                 <a:effectLst>
                   <a:outerShdw dist="35921" dir="2700000" algn="ctr" rotWithShape="0">
                     <a:schemeClr val="bg2"/>
@@ -1122,14 +1122,14 @@
         <p:spPr>
           <a:extLst>
             <a:ext uri="{909E8E84-426E-40DD-AFC4-6F175D3DCCD1}">
-              <a14:hiddenFill xmlns:a14="http://schemas.microsoft.com/office/drawing/2010/main" xmlns="">
+              <a14:hiddenFill xmlns="" xmlns:a14="http://schemas.microsoft.com/office/drawing/2010/main">
                 <a:solidFill>
                   <a:schemeClr val="accent1"/>
                 </a:solidFill>
               </a14:hiddenFill>
             </a:ext>
             <a:ext uri="{91240B29-F687-4F45-9708-019B960494DF}">
-              <a14:hiddenLine xmlns:a14="http://schemas.microsoft.com/office/drawing/2010/main" xmlns="" w="9525">
+              <a14:hiddenLine xmlns="" xmlns:a14="http://schemas.microsoft.com/office/drawing/2010/main" w="9525">
                 <a:solidFill>
                   <a:schemeClr val="tx1"/>
                 </a:solidFill>
@@ -1139,7 +1139,7 @@
               </a14:hiddenLine>
             </a:ext>
             <a:ext uri="{AF507438-7753-43E0-B8FC-AC1667EBCBE1}">
-              <a14:hiddenEffects xmlns:a14="http://schemas.microsoft.com/office/drawing/2010/main" xmlns="">
+              <a14:hiddenEffects xmlns="" xmlns:a14="http://schemas.microsoft.com/office/drawing/2010/main">
                 <a:effectLst>
                   <a:outerShdw dist="35921" dir="2700000" algn="ctr" rotWithShape="0">
                     <a:schemeClr val="bg2"/>
@@ -1240,14 +1240,14 @@
         <p:spPr>
           <a:extLst>
             <a:ext uri="{909E8E84-426E-40DD-AFC4-6F175D3DCCD1}">
-              <a14:hiddenFill xmlns:a14="http://schemas.microsoft.com/office/drawing/2010/main" xmlns="">
+              <a14:hiddenFill xmlns="" xmlns:a14="http://schemas.microsoft.com/office/drawing/2010/main">
                 <a:solidFill>
                   <a:schemeClr val="accent1"/>
                 </a:solidFill>
               </a14:hiddenFill>
             </a:ext>
             <a:ext uri="{91240B29-F687-4F45-9708-019B960494DF}">
-              <a14:hiddenLine xmlns:a14="http://schemas.microsoft.com/office/drawing/2010/main" xmlns="" w="9525">
+              <a14:hiddenLine xmlns="" xmlns:a14="http://schemas.microsoft.com/office/drawing/2010/main" w="9525">
                 <a:solidFill>
                   <a:schemeClr val="tx1"/>
                 </a:solidFill>
@@ -1257,7 +1257,7 @@
               </a14:hiddenLine>
             </a:ext>
             <a:ext uri="{AF507438-7753-43E0-B8FC-AC1667EBCBE1}">
-              <a14:hiddenEffects xmlns:a14="http://schemas.microsoft.com/office/drawing/2010/main" xmlns="">
+              <a14:hiddenEffects xmlns="" xmlns:a14="http://schemas.microsoft.com/office/drawing/2010/main">
                 <a:effectLst>
                   <a:outerShdw dist="35921" dir="2700000" algn="ctr" rotWithShape="0">
                     <a:schemeClr val="bg2"/>
@@ -1358,14 +1358,14 @@
         <p:spPr>
           <a:extLst>
             <a:ext uri="{909E8E84-426E-40DD-AFC4-6F175D3DCCD1}">
-              <a14:hiddenFill xmlns:a14="http://schemas.microsoft.com/office/drawing/2010/main" xmlns="">
+              <a14:hiddenFill xmlns="" xmlns:a14="http://schemas.microsoft.com/office/drawing/2010/main">
                 <a:solidFill>
                   <a:schemeClr val="accent1"/>
                 </a:solidFill>
               </a14:hiddenFill>
             </a:ext>
             <a:ext uri="{91240B29-F687-4F45-9708-019B960494DF}">
-              <a14:hiddenLine xmlns:a14="http://schemas.microsoft.com/office/drawing/2010/main" xmlns="" w="9525">
+              <a14:hiddenLine xmlns="" xmlns:a14="http://schemas.microsoft.com/office/drawing/2010/main" w="9525">
                 <a:solidFill>
                   <a:schemeClr val="tx1"/>
                 </a:solidFill>
@@ -1375,7 +1375,7 @@
               </a14:hiddenLine>
             </a:ext>
             <a:ext uri="{AF507438-7753-43E0-B8FC-AC1667EBCBE1}">
-              <a14:hiddenEffects xmlns:a14="http://schemas.microsoft.com/office/drawing/2010/main" xmlns="">
+              <a14:hiddenEffects xmlns="" xmlns:a14="http://schemas.microsoft.com/office/drawing/2010/main">
                 <a:effectLst>
                   <a:outerShdw dist="35921" dir="2700000" algn="ctr" rotWithShape="0">
                     <a:schemeClr val="bg2"/>
@@ -1476,14 +1476,14 @@
         <p:spPr>
           <a:extLst>
             <a:ext uri="{909E8E84-426E-40DD-AFC4-6F175D3DCCD1}">
-              <a14:hiddenFill xmlns:a14="http://schemas.microsoft.com/office/drawing/2010/main" xmlns="">
+              <a14:hiddenFill xmlns="" xmlns:a14="http://schemas.microsoft.com/office/drawing/2010/main">
                 <a:solidFill>
                   <a:schemeClr val="accent1"/>
                 </a:solidFill>
               </a14:hiddenFill>
             </a:ext>
             <a:ext uri="{91240B29-F687-4F45-9708-019B960494DF}">
-              <a14:hiddenLine xmlns:a14="http://schemas.microsoft.com/office/drawing/2010/main" xmlns="" w="9525">
+              <a14:hiddenLine xmlns="" xmlns:a14="http://schemas.microsoft.com/office/drawing/2010/main" w="9525">
                 <a:solidFill>
                   <a:schemeClr val="tx1"/>
                 </a:solidFill>
@@ -1493,7 +1493,7 @@
               </a14:hiddenLine>
             </a:ext>
             <a:ext uri="{AF507438-7753-43E0-B8FC-AC1667EBCBE1}">
-              <a14:hiddenEffects xmlns:a14="http://schemas.microsoft.com/office/drawing/2010/main" xmlns="">
+              <a14:hiddenEffects xmlns="" xmlns:a14="http://schemas.microsoft.com/office/drawing/2010/main">
                 <a:effectLst>
                   <a:outerShdw dist="35921" dir="2700000" algn="ctr" rotWithShape="0">
                     <a:schemeClr val="bg2"/>
@@ -1594,14 +1594,14 @@
         <p:spPr>
           <a:extLst>
             <a:ext uri="{909E8E84-426E-40DD-AFC4-6F175D3DCCD1}">
-              <a14:hiddenFill xmlns:a14="http://schemas.microsoft.com/office/drawing/2010/main" xmlns="">
+              <a14:hiddenFill xmlns="" xmlns:a14="http://schemas.microsoft.com/office/drawing/2010/main">
                 <a:solidFill>
                   <a:schemeClr val="accent1"/>
                 </a:solidFill>
               </a14:hiddenFill>
             </a:ext>
             <a:ext uri="{91240B29-F687-4F45-9708-019B960494DF}">
-              <a14:hiddenLine xmlns:a14="http://schemas.microsoft.com/office/drawing/2010/main" xmlns="" w="9525">
+              <a14:hiddenLine xmlns="" xmlns:a14="http://schemas.microsoft.com/office/drawing/2010/main" w="9525">
                 <a:solidFill>
                   <a:schemeClr val="tx1"/>
                 </a:solidFill>
@@ -1611,7 +1611,7 @@
               </a14:hiddenLine>
             </a:ext>
             <a:ext uri="{AF507438-7753-43E0-B8FC-AC1667EBCBE1}">
-              <a14:hiddenEffects xmlns:a14="http://schemas.microsoft.com/office/drawing/2010/main" xmlns="">
+              <a14:hiddenEffects xmlns="" xmlns:a14="http://schemas.microsoft.com/office/drawing/2010/main">
                 <a:effectLst>
                   <a:outerShdw dist="35921" dir="2700000" algn="ctr" rotWithShape="0">
                     <a:schemeClr val="bg2"/>
@@ -1712,14 +1712,14 @@
         <p:spPr>
           <a:extLst>
             <a:ext uri="{909E8E84-426E-40DD-AFC4-6F175D3DCCD1}">
-              <a14:hiddenFill xmlns:a14="http://schemas.microsoft.com/office/drawing/2010/main" xmlns="">
+              <a14:hiddenFill xmlns="" xmlns:a14="http://schemas.microsoft.com/office/drawing/2010/main">
                 <a:solidFill>
                   <a:schemeClr val="accent1"/>
                 </a:solidFill>
               </a14:hiddenFill>
             </a:ext>
             <a:ext uri="{91240B29-F687-4F45-9708-019B960494DF}">
-              <a14:hiddenLine xmlns:a14="http://schemas.microsoft.com/office/drawing/2010/main" xmlns="" w="9525">
+              <a14:hiddenLine xmlns="" xmlns:a14="http://schemas.microsoft.com/office/drawing/2010/main" w="9525">
                 <a:solidFill>
                   <a:schemeClr val="tx1"/>
                 </a:solidFill>
@@ -1729,7 +1729,7 @@
               </a14:hiddenLine>
             </a:ext>
             <a:ext uri="{AF507438-7753-43E0-B8FC-AC1667EBCBE1}">
-              <a14:hiddenEffects xmlns:a14="http://schemas.microsoft.com/office/drawing/2010/main" xmlns="">
+              <a14:hiddenEffects xmlns="" xmlns:a14="http://schemas.microsoft.com/office/drawing/2010/main">
                 <a:effectLst>
                   <a:outerShdw dist="35921" dir="2700000" algn="ctr" rotWithShape="0">
                     <a:schemeClr val="bg2"/>
@@ -1830,14 +1830,14 @@
         <p:spPr>
           <a:extLst>
             <a:ext uri="{909E8E84-426E-40DD-AFC4-6F175D3DCCD1}">
-              <a14:hiddenFill xmlns:a14="http://schemas.microsoft.com/office/drawing/2010/main" xmlns="">
+              <a14:hiddenFill xmlns="" xmlns:a14="http://schemas.microsoft.com/office/drawing/2010/main">
                 <a:solidFill>
                   <a:schemeClr val="accent1"/>
                 </a:solidFill>
               </a14:hiddenFill>
             </a:ext>
             <a:ext uri="{91240B29-F687-4F45-9708-019B960494DF}">
-              <a14:hiddenLine xmlns:a14="http://schemas.microsoft.com/office/drawing/2010/main" xmlns="" w="9525">
+              <a14:hiddenLine xmlns="" xmlns:a14="http://schemas.microsoft.com/office/drawing/2010/main" w="9525">
                 <a:solidFill>
                   <a:schemeClr val="tx1"/>
                 </a:solidFill>
@@ -1847,7 +1847,7 @@
               </a14:hiddenLine>
             </a:ext>
             <a:ext uri="{AF507438-7753-43E0-B8FC-AC1667EBCBE1}">
-              <a14:hiddenEffects xmlns:a14="http://schemas.microsoft.com/office/drawing/2010/main" xmlns="">
+              <a14:hiddenEffects xmlns="" xmlns:a14="http://schemas.microsoft.com/office/drawing/2010/main">
                 <a:effectLst>
                   <a:outerShdw dist="35921" dir="2700000" algn="ctr" rotWithShape="0">
                     <a:schemeClr val="bg2"/>
@@ -1966,14 +1966,14 @@
         <p:spPr>
           <a:extLst>
             <a:ext uri="{909E8E84-426E-40DD-AFC4-6F175D3DCCD1}">
-              <a14:hiddenFill xmlns:a14="http://schemas.microsoft.com/office/drawing/2010/main" xmlns="">
+              <a14:hiddenFill xmlns="" xmlns:a14="http://schemas.microsoft.com/office/drawing/2010/main">
                 <a:solidFill>
                   <a:schemeClr val="accent1"/>
                 </a:solidFill>
               </a14:hiddenFill>
             </a:ext>
             <a:ext uri="{91240B29-F687-4F45-9708-019B960494DF}">
-              <a14:hiddenLine xmlns:a14="http://schemas.microsoft.com/office/drawing/2010/main" xmlns="" w="9525">
+              <a14:hiddenLine xmlns="" xmlns:a14="http://schemas.microsoft.com/office/drawing/2010/main" w="9525">
                 <a:solidFill>
                   <a:schemeClr val="tx1"/>
                 </a:solidFill>
@@ -1983,7 +1983,7 @@
               </a14:hiddenLine>
             </a:ext>
             <a:ext uri="{AF507438-7753-43E0-B8FC-AC1667EBCBE1}">
-              <a14:hiddenEffects xmlns:a14="http://schemas.microsoft.com/office/drawing/2010/main" xmlns="">
+              <a14:hiddenEffects xmlns="" xmlns:a14="http://schemas.microsoft.com/office/drawing/2010/main">
                 <a:effectLst>
                   <a:outerShdw dist="35921" dir="2700000" algn="ctr" rotWithShape="0">
                     <a:schemeClr val="bg2"/>
@@ -2084,14 +2084,14 @@
         <p:spPr>
           <a:extLst>
             <a:ext uri="{909E8E84-426E-40DD-AFC4-6F175D3DCCD1}">
-              <a14:hiddenFill xmlns:a14="http://schemas.microsoft.com/office/drawing/2010/main" xmlns="">
+              <a14:hiddenFill xmlns="" xmlns:a14="http://schemas.microsoft.com/office/drawing/2010/main">
                 <a:solidFill>
                   <a:schemeClr val="accent1"/>
                 </a:solidFill>
               </a14:hiddenFill>
             </a:ext>
             <a:ext uri="{91240B29-F687-4F45-9708-019B960494DF}">
-              <a14:hiddenLine xmlns:a14="http://schemas.microsoft.com/office/drawing/2010/main" xmlns="" w="9525">
+              <a14:hiddenLine xmlns="" xmlns:a14="http://schemas.microsoft.com/office/drawing/2010/main" w="9525">
                 <a:solidFill>
                   <a:schemeClr val="tx1"/>
                 </a:solidFill>
@@ -2101,7 +2101,7 @@
               </a14:hiddenLine>
             </a:ext>
             <a:ext uri="{AF507438-7753-43E0-B8FC-AC1667EBCBE1}">
-              <a14:hiddenEffects xmlns:a14="http://schemas.microsoft.com/office/drawing/2010/main" xmlns="">
+              <a14:hiddenEffects xmlns="" xmlns:a14="http://schemas.microsoft.com/office/drawing/2010/main">
                 <a:effectLst>
                   <a:outerShdw dist="35921" dir="2700000" algn="ctr" rotWithShape="0">
                     <a:schemeClr val="bg2"/>
@@ -2202,14 +2202,14 @@
         <p:spPr>
           <a:extLst>
             <a:ext uri="{909E8E84-426E-40DD-AFC4-6F175D3DCCD1}">
-              <a14:hiddenFill xmlns:a14="http://schemas.microsoft.com/office/drawing/2010/main" xmlns="">
+              <a14:hiddenFill xmlns="" xmlns:a14="http://schemas.microsoft.com/office/drawing/2010/main">
                 <a:solidFill>
                   <a:schemeClr val="accent1"/>
                 </a:solidFill>
               </a14:hiddenFill>
             </a:ext>
             <a:ext uri="{91240B29-F687-4F45-9708-019B960494DF}">
-              <a14:hiddenLine xmlns:a14="http://schemas.microsoft.com/office/drawing/2010/main" xmlns="" w="9525">
+              <a14:hiddenLine xmlns="" xmlns:a14="http://schemas.microsoft.com/office/drawing/2010/main" w="9525">
                 <a:solidFill>
                   <a:schemeClr val="tx1"/>
                 </a:solidFill>
@@ -2219,7 +2219,7 @@
               </a14:hiddenLine>
             </a:ext>
             <a:ext uri="{AF507438-7753-43E0-B8FC-AC1667EBCBE1}">
-              <a14:hiddenEffects xmlns:a14="http://schemas.microsoft.com/office/drawing/2010/main" xmlns="">
+              <a14:hiddenEffects xmlns="" xmlns:a14="http://schemas.microsoft.com/office/drawing/2010/main">
                 <a:effectLst>
                   <a:outerShdw dist="35921" dir="2700000" algn="ctr" rotWithShape="0">
                     <a:schemeClr val="bg2"/>
@@ -2320,14 +2320,14 @@
         <p:spPr>
           <a:extLst>
             <a:ext uri="{909E8E84-426E-40DD-AFC4-6F175D3DCCD1}">
-              <a14:hiddenFill xmlns:a14="http://schemas.microsoft.com/office/drawing/2010/main" xmlns="">
+              <a14:hiddenFill xmlns="" xmlns:a14="http://schemas.microsoft.com/office/drawing/2010/main">
                 <a:solidFill>
                   <a:schemeClr val="accent1"/>
                 </a:solidFill>
               </a14:hiddenFill>
             </a:ext>
             <a:ext uri="{91240B29-F687-4F45-9708-019B960494DF}">
-              <a14:hiddenLine xmlns:a14="http://schemas.microsoft.com/office/drawing/2010/main" xmlns="" w="9525">
+              <a14:hiddenLine xmlns="" xmlns:a14="http://schemas.microsoft.com/office/drawing/2010/main" w="9525">
                 <a:solidFill>
                   <a:schemeClr val="tx1"/>
                 </a:solidFill>
@@ -2337,7 +2337,7 @@
               </a14:hiddenLine>
             </a:ext>
             <a:ext uri="{AF507438-7753-43E0-B8FC-AC1667EBCBE1}">
-              <a14:hiddenEffects xmlns:a14="http://schemas.microsoft.com/office/drawing/2010/main" xmlns="">
+              <a14:hiddenEffects xmlns="" xmlns:a14="http://schemas.microsoft.com/office/drawing/2010/main">
                 <a:effectLst>
                   <a:outerShdw dist="35921" dir="2700000" algn="ctr" rotWithShape="0">
                     <a:schemeClr val="bg2"/>
@@ -2438,14 +2438,14 @@
         <p:spPr>
           <a:extLst>
             <a:ext uri="{909E8E84-426E-40DD-AFC4-6F175D3DCCD1}">
-              <a14:hiddenFill xmlns:a14="http://schemas.microsoft.com/office/drawing/2010/main" xmlns="">
+              <a14:hiddenFill xmlns="" xmlns:a14="http://schemas.microsoft.com/office/drawing/2010/main">
                 <a:solidFill>
                   <a:schemeClr val="accent1"/>
                 </a:solidFill>
               </a14:hiddenFill>
             </a:ext>
             <a:ext uri="{91240B29-F687-4F45-9708-019B960494DF}">
-              <a14:hiddenLine xmlns:a14="http://schemas.microsoft.com/office/drawing/2010/main" xmlns="" w="9525">
+              <a14:hiddenLine xmlns="" xmlns:a14="http://schemas.microsoft.com/office/drawing/2010/main" w="9525">
                 <a:solidFill>
                   <a:schemeClr val="tx1"/>
                 </a:solidFill>
@@ -2455,7 +2455,7 @@
               </a14:hiddenLine>
             </a:ext>
             <a:ext uri="{AF507438-7753-43E0-B8FC-AC1667EBCBE1}">
-              <a14:hiddenEffects xmlns:a14="http://schemas.microsoft.com/office/drawing/2010/main" xmlns="">
+              <a14:hiddenEffects xmlns="" xmlns:a14="http://schemas.microsoft.com/office/drawing/2010/main">
                 <a:effectLst>
                   <a:outerShdw dist="35921" dir="2700000" algn="ctr" rotWithShape="0">
                     <a:schemeClr val="bg2"/>
@@ -2556,14 +2556,14 @@
         <p:spPr>
           <a:extLst>
             <a:ext uri="{909E8E84-426E-40DD-AFC4-6F175D3DCCD1}">
-              <a14:hiddenFill xmlns:a14="http://schemas.microsoft.com/office/drawing/2010/main" xmlns="">
+              <a14:hiddenFill xmlns="" xmlns:a14="http://schemas.microsoft.com/office/drawing/2010/main">
                 <a:solidFill>
                   <a:schemeClr val="accent1"/>
                 </a:solidFill>
               </a14:hiddenFill>
             </a:ext>
             <a:ext uri="{91240B29-F687-4F45-9708-019B960494DF}">
-              <a14:hiddenLine xmlns:a14="http://schemas.microsoft.com/office/drawing/2010/main" xmlns="" w="9525">
+              <a14:hiddenLine xmlns="" xmlns:a14="http://schemas.microsoft.com/office/drawing/2010/main" w="9525">
                 <a:solidFill>
                   <a:schemeClr val="tx1"/>
                 </a:solidFill>
@@ -2573,7 +2573,7 @@
               </a14:hiddenLine>
             </a:ext>
             <a:ext uri="{AF507438-7753-43E0-B8FC-AC1667EBCBE1}">
-              <a14:hiddenEffects xmlns:a14="http://schemas.microsoft.com/office/drawing/2010/main" xmlns="">
+              <a14:hiddenEffects xmlns="" xmlns:a14="http://schemas.microsoft.com/office/drawing/2010/main">
                 <a:effectLst>
                   <a:outerShdw dist="35921" dir="2700000" algn="ctr" rotWithShape="0">
                     <a:schemeClr val="bg2"/>
@@ -6504,11 +6504,7 @@
             </a:r>
             <a:r>
               <a:rPr lang="en-US" smtClean="0"/>
-              <a:t>: </a:t>
-            </a:r>
-            <a:r>
-              <a:rPr lang="en-US" smtClean="0"/>
-              <a:t>SPRPxxx </a:t>
+              <a:t>: SPRPxxx </a:t>
             </a:r>
             <a:endParaRPr lang="en-US" dirty="0"/>
           </a:p>
@@ -7405,14 +7401,14 @@
         <p:spPr>
           <a:extLst>
             <a:ext uri="{909E8E84-426E-40DD-AFC4-6F175D3DCCD1}">
-              <a14:hiddenFill xmlns:a14="http://schemas.microsoft.com/office/drawing/2010/main" xmlns="">
+              <a14:hiddenFill xmlns="" xmlns:a14="http://schemas.microsoft.com/office/drawing/2010/main">
                 <a:solidFill>
                   <a:schemeClr val="accent1"/>
                 </a:solidFill>
               </a14:hiddenFill>
             </a:ext>
             <a:ext uri="{91240B29-F687-4F45-9708-019B960494DF}">
-              <a14:hiddenLine xmlns:a14="http://schemas.microsoft.com/office/drawing/2010/main" xmlns="" w="9525">
+              <a14:hiddenLine xmlns="" xmlns:a14="http://schemas.microsoft.com/office/drawing/2010/main" w="9525">
                 <a:solidFill>
                   <a:schemeClr val="tx1"/>
                 </a:solidFill>
@@ -7422,7 +7418,7 @@
               </a14:hiddenLine>
             </a:ext>
             <a:ext uri="{AF507438-7753-43E0-B8FC-AC1667EBCBE1}">
-              <a14:hiddenEffects xmlns:a14="http://schemas.microsoft.com/office/drawing/2010/main" xmlns="">
+              <a14:hiddenEffects xmlns="" xmlns:a14="http://schemas.microsoft.com/office/drawing/2010/main">
                 <a:effectLst>
                   <a:outerShdw dist="35921" dir="2700000" algn="ctr" rotWithShape="0">
                     <a:schemeClr val="bg2"/>
@@ -7972,14 +7968,14 @@
         <p:spPr>
           <a:extLst>
             <a:ext uri="{909E8E84-426E-40DD-AFC4-6F175D3DCCD1}">
-              <a14:hiddenFill xmlns:a14="http://schemas.microsoft.com/office/drawing/2010/main" xmlns="">
+              <a14:hiddenFill xmlns="" xmlns:a14="http://schemas.microsoft.com/office/drawing/2010/main">
                 <a:solidFill>
                   <a:schemeClr val="accent1"/>
                 </a:solidFill>
               </a14:hiddenFill>
             </a:ext>
             <a:ext uri="{91240B29-F687-4F45-9708-019B960494DF}">
-              <a14:hiddenLine xmlns:a14="http://schemas.microsoft.com/office/drawing/2010/main" xmlns="" w="9525">
+              <a14:hiddenLine xmlns="" xmlns:a14="http://schemas.microsoft.com/office/drawing/2010/main" w="9525">
                 <a:solidFill>
                   <a:schemeClr val="tx1"/>
                 </a:solidFill>
@@ -7989,7 +7985,7 @@
               </a14:hiddenLine>
             </a:ext>
             <a:ext uri="{AF507438-7753-43E0-B8FC-AC1667EBCBE1}">
-              <a14:hiddenEffects xmlns:a14="http://schemas.microsoft.com/office/drawing/2010/main" xmlns="">
+              <a14:hiddenEffects xmlns="" xmlns:a14="http://schemas.microsoft.com/office/drawing/2010/main">
                 <a:effectLst>
                   <a:outerShdw dist="35921" dir="2700000" algn="ctr" rotWithShape="0">
                     <a:schemeClr val="bg2"/>
@@ -8299,14 +8295,14 @@
         <p:spPr>
           <a:extLst>
             <a:ext uri="{909E8E84-426E-40DD-AFC4-6F175D3DCCD1}">
-              <a14:hiddenFill xmlns:a14="http://schemas.microsoft.com/office/drawing/2010/main" xmlns="">
+              <a14:hiddenFill xmlns="" xmlns:a14="http://schemas.microsoft.com/office/drawing/2010/main">
                 <a:solidFill>
                   <a:schemeClr val="accent1"/>
                 </a:solidFill>
               </a14:hiddenFill>
             </a:ext>
             <a:ext uri="{91240B29-F687-4F45-9708-019B960494DF}">
-              <a14:hiddenLine xmlns:a14="http://schemas.microsoft.com/office/drawing/2010/main" xmlns="" w="9525">
+              <a14:hiddenLine xmlns="" xmlns:a14="http://schemas.microsoft.com/office/drawing/2010/main" w="9525">
                 <a:solidFill>
                   <a:schemeClr val="tx1"/>
                 </a:solidFill>
@@ -8316,7 +8312,7 @@
               </a14:hiddenLine>
             </a:ext>
             <a:ext uri="{AF507438-7753-43E0-B8FC-AC1667EBCBE1}">
-              <a14:hiddenEffects xmlns:a14="http://schemas.microsoft.com/office/drawing/2010/main" xmlns="">
+              <a14:hiddenEffects xmlns="" xmlns:a14="http://schemas.microsoft.com/office/drawing/2010/main">
                 <a:effectLst>
                   <a:outerShdw dist="35921" dir="2700000" algn="ctr" rotWithShape="0">
                     <a:schemeClr val="bg2"/>
@@ -8564,14 +8560,14 @@
         <p:spPr>
           <a:extLst>
             <a:ext uri="{909E8E84-426E-40DD-AFC4-6F175D3DCCD1}">
-              <a14:hiddenFill xmlns:a14="http://schemas.microsoft.com/office/drawing/2010/main" xmlns="">
+              <a14:hiddenFill xmlns="" xmlns:a14="http://schemas.microsoft.com/office/drawing/2010/main">
                 <a:solidFill>
                   <a:schemeClr val="accent1"/>
                 </a:solidFill>
               </a14:hiddenFill>
             </a:ext>
             <a:ext uri="{91240B29-F687-4F45-9708-019B960494DF}">
-              <a14:hiddenLine xmlns:a14="http://schemas.microsoft.com/office/drawing/2010/main" xmlns="" w="9525">
+              <a14:hiddenLine xmlns="" xmlns:a14="http://schemas.microsoft.com/office/drawing/2010/main" w="9525">
                 <a:solidFill>
                   <a:schemeClr val="tx1"/>
                 </a:solidFill>
@@ -8581,7 +8577,7 @@
               </a14:hiddenLine>
             </a:ext>
             <a:ext uri="{AF507438-7753-43E0-B8FC-AC1667EBCBE1}">
-              <a14:hiddenEffects xmlns:a14="http://schemas.microsoft.com/office/drawing/2010/main" xmlns="">
+              <a14:hiddenEffects xmlns="" xmlns:a14="http://schemas.microsoft.com/office/drawing/2010/main">
                 <a:effectLst>
                   <a:outerShdw dist="35921" dir="2700000" algn="ctr" rotWithShape="0">
                     <a:schemeClr val="bg2"/>
@@ -9113,11 +9109,15 @@
             </a:pPr>
             <a:r>
               <a:rPr lang="en-US" sz="1600" dirty="0" smtClean="0"/>
-              <a:t>Each register defines either PRI or MAXWAIT or both. The PRI field will declare the priority for that requestor</a:t>
-            </a:r>
-            <a:r>
-              <a:rPr lang="en-US" sz="1600" dirty="0" smtClean="0"/>
-              <a:t>. UPRI is for urgent priority (see later) </a:t>
+              <a:t>Each register defines either PRI or MAXWAIT or both. The PRI field will declare the priority for </a:t>
+            </a:r>
+            <a:r>
+              <a:rPr lang="en-US" sz="1600" smtClean="0"/>
+              <a:t>that </a:t>
+            </a:r>
+            <a:r>
+              <a:rPr lang="en-US" sz="1600" smtClean="0"/>
+              <a:t>requestor. </a:t>
             </a:r>
             <a:r>
               <a:rPr lang="en-US" sz="1600" dirty="0" smtClean="0"/>
@@ -9252,14 +9252,14 @@
         <p:spPr>
           <a:extLst>
             <a:ext uri="{909E8E84-426E-40DD-AFC4-6F175D3DCCD1}">
-              <a14:hiddenFill xmlns:a14="http://schemas.microsoft.com/office/drawing/2010/main" xmlns="">
+              <a14:hiddenFill xmlns="" xmlns:a14="http://schemas.microsoft.com/office/drawing/2010/main">
                 <a:solidFill>
                   <a:schemeClr val="accent1"/>
                 </a:solidFill>
               </a14:hiddenFill>
             </a:ext>
             <a:ext uri="{91240B29-F687-4F45-9708-019B960494DF}">
-              <a14:hiddenLine xmlns:a14="http://schemas.microsoft.com/office/drawing/2010/main" xmlns="" w="9525">
+              <a14:hiddenLine xmlns="" xmlns:a14="http://schemas.microsoft.com/office/drawing/2010/main" w="9525">
                 <a:solidFill>
                   <a:schemeClr val="tx1"/>
                 </a:solidFill>
@@ -9269,7 +9269,7 @@
               </a14:hiddenLine>
             </a:ext>
             <a:ext uri="{AF507438-7753-43E0-B8FC-AC1667EBCBE1}">
-              <a14:hiddenEffects xmlns:a14="http://schemas.microsoft.com/office/drawing/2010/main" xmlns="">
+              <a14:hiddenEffects xmlns="" xmlns:a14="http://schemas.microsoft.com/office/drawing/2010/main">
                 <a:effectLst>
                   <a:outerShdw dist="35921" dir="2700000" algn="ctr" rotWithShape="0">
                     <a:schemeClr val="bg2"/>
@@ -9499,14 +9499,14 @@
         <p:spPr>
           <a:extLst>
             <a:ext uri="{909E8E84-426E-40DD-AFC4-6F175D3DCCD1}">
-              <a14:hiddenFill xmlns:a14="http://schemas.microsoft.com/office/drawing/2010/main" xmlns="">
+              <a14:hiddenFill xmlns="" xmlns:a14="http://schemas.microsoft.com/office/drawing/2010/main">
                 <a:solidFill>
                   <a:schemeClr val="accent1"/>
                 </a:solidFill>
               </a14:hiddenFill>
             </a:ext>
             <a:ext uri="{91240B29-F687-4F45-9708-019B960494DF}">
-              <a14:hiddenLine xmlns:a14="http://schemas.microsoft.com/office/drawing/2010/main" xmlns="" w="9525">
+              <a14:hiddenLine xmlns="" xmlns:a14="http://schemas.microsoft.com/office/drawing/2010/main" w="9525">
                 <a:solidFill>
                   <a:schemeClr val="tx1"/>
                 </a:solidFill>
@@ -9516,7 +9516,7 @@
               </a14:hiddenLine>
             </a:ext>
             <a:ext uri="{AF507438-7753-43E0-B8FC-AC1667EBCBE1}">
-              <a14:hiddenEffects xmlns:a14="http://schemas.microsoft.com/office/drawing/2010/main" xmlns="">
+              <a14:hiddenEffects xmlns="" xmlns:a14="http://schemas.microsoft.com/office/drawing/2010/main">
                 <a:effectLst>
                   <a:outerShdw dist="35921" dir="2700000" algn="ctr" rotWithShape="0">
                     <a:schemeClr val="bg2"/>
@@ -9766,11 +9766,7 @@
             </a:pPr>
             <a:r>
               <a:rPr lang="en-US" sz="2200" dirty="0" smtClean="0"/>
-              <a:t>MAXWAIT </a:t>
-            </a:r>
-            <a:r>
-              <a:rPr lang="en-US" sz="2200" dirty="0" smtClean="0"/>
-              <a:t>is only for block transfers</a:t>
+              <a:t>MAXWAIT is only for block transfers</a:t>
             </a:r>
           </a:p>
           <a:p>
@@ -9795,14 +9791,14 @@
         <p:spPr>
           <a:extLst>
             <a:ext uri="{909E8E84-426E-40DD-AFC4-6F175D3DCCD1}">
-              <a14:hiddenFill xmlns:a14="http://schemas.microsoft.com/office/drawing/2010/main" xmlns="">
+              <a14:hiddenFill xmlns="" xmlns:a14="http://schemas.microsoft.com/office/drawing/2010/main">
                 <a:solidFill>
                   <a:schemeClr val="accent1"/>
                 </a:solidFill>
               </a14:hiddenFill>
             </a:ext>
             <a:ext uri="{91240B29-F687-4F45-9708-019B960494DF}">
-              <a14:hiddenLine xmlns:a14="http://schemas.microsoft.com/office/drawing/2010/main" xmlns="" w="9525">
+              <a14:hiddenLine xmlns="" xmlns:a14="http://schemas.microsoft.com/office/drawing/2010/main" w="9525">
                 <a:solidFill>
                   <a:schemeClr val="tx1"/>
                 </a:solidFill>
@@ -9812,7 +9808,7 @@
               </a14:hiddenLine>
             </a:ext>
             <a:ext uri="{AF507438-7753-43E0-B8FC-AC1667EBCBE1}">
-              <a14:hiddenEffects xmlns:a14="http://schemas.microsoft.com/office/drawing/2010/main" xmlns="">
+              <a14:hiddenEffects xmlns="" xmlns:a14="http://schemas.microsoft.com/office/drawing/2010/main">
                 <a:effectLst>
                   <a:outerShdw dist="35921" dir="2700000" algn="ctr" rotWithShape="0">
                     <a:schemeClr val="bg2"/>
@@ -9989,14 +9985,14 @@
         <p:spPr>
           <a:extLst>
             <a:ext uri="{909E8E84-426E-40DD-AFC4-6F175D3DCCD1}">
-              <a14:hiddenFill xmlns:a14="http://schemas.microsoft.com/office/drawing/2010/main" xmlns="">
+              <a14:hiddenFill xmlns="" xmlns:a14="http://schemas.microsoft.com/office/drawing/2010/main">
                 <a:solidFill>
                   <a:schemeClr val="accent1"/>
                 </a:solidFill>
               </a14:hiddenFill>
             </a:ext>
             <a:ext uri="{91240B29-F687-4F45-9708-019B960494DF}">
-              <a14:hiddenLine xmlns:a14="http://schemas.microsoft.com/office/drawing/2010/main" xmlns="" w="9525">
+              <a14:hiddenLine xmlns="" xmlns:a14="http://schemas.microsoft.com/office/drawing/2010/main" w="9525">
                 <a:solidFill>
                   <a:schemeClr val="tx1"/>
                 </a:solidFill>
@@ -10006,7 +10002,7 @@
               </a14:hiddenLine>
             </a:ext>
             <a:ext uri="{AF507438-7753-43E0-B8FC-AC1667EBCBE1}">
-              <a14:hiddenEffects xmlns:a14="http://schemas.microsoft.com/office/drawing/2010/main" xmlns="">
+              <a14:hiddenEffects xmlns="" xmlns:a14="http://schemas.microsoft.com/office/drawing/2010/main">
                 <a:effectLst>
                   <a:outerShdw dist="35921" dir="2700000" algn="ctr" rotWithShape="0">
                     <a:schemeClr val="bg2"/>
@@ -10150,14 +10146,14 @@
         <p:spPr>
           <a:extLst>
             <a:ext uri="{909E8E84-426E-40DD-AFC4-6F175D3DCCD1}">
-              <a14:hiddenFill xmlns:a14="http://schemas.microsoft.com/office/drawing/2010/main" xmlns="">
+              <a14:hiddenFill xmlns="" xmlns:a14="http://schemas.microsoft.com/office/drawing/2010/main">
                 <a:solidFill>
                   <a:schemeClr val="accent1"/>
                 </a:solidFill>
               </a14:hiddenFill>
             </a:ext>
             <a:ext uri="{91240B29-F687-4F45-9708-019B960494DF}">
-              <a14:hiddenLine xmlns:a14="http://schemas.microsoft.com/office/drawing/2010/main" xmlns="" w="9525">
+              <a14:hiddenLine xmlns="" xmlns:a14="http://schemas.microsoft.com/office/drawing/2010/main" w="9525">
                 <a:solidFill>
                   <a:schemeClr val="tx1"/>
                 </a:solidFill>
@@ -10167,7 +10163,7 @@
               </a14:hiddenLine>
             </a:ext>
             <a:ext uri="{AF507438-7753-43E0-B8FC-AC1667EBCBE1}">
-              <a14:hiddenEffects xmlns:a14="http://schemas.microsoft.com/office/drawing/2010/main" xmlns="">
+              <a14:hiddenEffects xmlns="" xmlns:a14="http://schemas.microsoft.com/office/drawing/2010/main">
                 <a:effectLst>
                   <a:outerShdw dist="35921" dir="2700000" algn="ctr" rotWithShape="0">
                     <a:schemeClr val="bg2"/>
@@ -10849,14 +10845,14 @@
         <p:spPr>
           <a:extLst>
             <a:ext uri="{909E8E84-426E-40DD-AFC4-6F175D3DCCD1}">
-              <a14:hiddenFill xmlns:a14="http://schemas.microsoft.com/office/drawing/2010/main" xmlns="">
+              <a14:hiddenFill xmlns="" xmlns:a14="http://schemas.microsoft.com/office/drawing/2010/main">
                 <a:solidFill>
                   <a:schemeClr val="accent1"/>
                 </a:solidFill>
               </a14:hiddenFill>
             </a:ext>
             <a:ext uri="{91240B29-F687-4F45-9708-019B960494DF}">
-              <a14:hiddenLine xmlns:a14="http://schemas.microsoft.com/office/drawing/2010/main" xmlns="" w="9525">
+              <a14:hiddenLine xmlns="" xmlns:a14="http://schemas.microsoft.com/office/drawing/2010/main" w="9525">
                 <a:solidFill>
                   <a:schemeClr val="tx1"/>
                 </a:solidFill>
@@ -10866,7 +10862,7 @@
               </a14:hiddenLine>
             </a:ext>
             <a:ext uri="{AF507438-7753-43E0-B8FC-AC1667EBCBE1}">
-              <a14:hiddenEffects xmlns:a14="http://schemas.microsoft.com/office/drawing/2010/main" xmlns="">
+              <a14:hiddenEffects xmlns="" xmlns:a14="http://schemas.microsoft.com/office/drawing/2010/main">
                 <a:effectLst>
                   <a:outerShdw dist="35921" dir="2700000" algn="ctr" rotWithShape="0">
                     <a:schemeClr val="bg2"/>
@@ -11079,14 +11075,14 @@
         <p:spPr>
           <a:extLst>
             <a:ext uri="{909E8E84-426E-40DD-AFC4-6F175D3DCCD1}">
-              <a14:hiddenFill xmlns:a14="http://schemas.microsoft.com/office/drawing/2010/main" xmlns="">
+              <a14:hiddenFill xmlns="" xmlns:a14="http://schemas.microsoft.com/office/drawing/2010/main">
                 <a:solidFill>
                   <a:schemeClr val="accent1"/>
                 </a:solidFill>
               </a14:hiddenFill>
             </a:ext>
             <a:ext uri="{91240B29-F687-4F45-9708-019B960494DF}">
-              <a14:hiddenLine xmlns:a14="http://schemas.microsoft.com/office/drawing/2010/main" xmlns="" w="9525">
+              <a14:hiddenLine xmlns="" xmlns:a14="http://schemas.microsoft.com/office/drawing/2010/main" w="9525">
                 <a:solidFill>
                   <a:schemeClr val="tx1"/>
                 </a:solidFill>
@@ -11096,7 +11092,7 @@
               </a14:hiddenLine>
             </a:ext>
             <a:ext uri="{AF507438-7753-43E0-B8FC-AC1667EBCBE1}">
-              <a14:hiddenEffects xmlns:a14="http://schemas.microsoft.com/office/drawing/2010/main" xmlns="">
+              <a14:hiddenEffects xmlns="" xmlns:a14="http://schemas.microsoft.com/office/drawing/2010/main">
                 <a:effectLst>
                   <a:outerShdw dist="35921" dir="2700000" algn="ctr" rotWithShape="0">
                     <a:schemeClr val="bg2"/>
@@ -11259,14 +11255,14 @@
         <p:spPr>
           <a:extLst>
             <a:ext uri="{909E8E84-426E-40DD-AFC4-6F175D3DCCD1}">
-              <a14:hiddenFill xmlns:a14="http://schemas.microsoft.com/office/drawing/2010/main" xmlns="">
+              <a14:hiddenFill xmlns="" xmlns:a14="http://schemas.microsoft.com/office/drawing/2010/main">
                 <a:solidFill>
                   <a:schemeClr val="accent1"/>
                 </a:solidFill>
               </a14:hiddenFill>
             </a:ext>
             <a:ext uri="{91240B29-F687-4F45-9708-019B960494DF}">
-              <a14:hiddenLine xmlns:a14="http://schemas.microsoft.com/office/drawing/2010/main" xmlns="" w="9525">
+              <a14:hiddenLine xmlns="" xmlns:a14="http://schemas.microsoft.com/office/drawing/2010/main" w="9525">
                 <a:solidFill>
                   <a:schemeClr val="tx1"/>
                 </a:solidFill>
@@ -11276,7 +11272,7 @@
               </a14:hiddenLine>
             </a:ext>
             <a:ext uri="{AF507438-7753-43E0-B8FC-AC1667EBCBE1}">
-              <a14:hiddenEffects xmlns:a14="http://schemas.microsoft.com/office/drawing/2010/main" xmlns="">
+              <a14:hiddenEffects xmlns="" xmlns:a14="http://schemas.microsoft.com/office/drawing/2010/main">
                 <a:effectLst>
                   <a:outerShdw dist="35921" dir="2700000" algn="ctr" rotWithShape="0">
                     <a:schemeClr val="bg2"/>
@@ -11497,14 +11493,14 @@
         <p:spPr>
           <a:extLst>
             <a:ext uri="{909E8E84-426E-40DD-AFC4-6F175D3DCCD1}">
-              <a14:hiddenFill xmlns:a14="http://schemas.microsoft.com/office/drawing/2010/main" xmlns="">
+              <a14:hiddenFill xmlns="" xmlns:a14="http://schemas.microsoft.com/office/drawing/2010/main">
                 <a:solidFill>
                   <a:schemeClr val="accent1"/>
                 </a:solidFill>
               </a14:hiddenFill>
             </a:ext>
             <a:ext uri="{91240B29-F687-4F45-9708-019B960494DF}">
-              <a14:hiddenLine xmlns:a14="http://schemas.microsoft.com/office/drawing/2010/main" xmlns="" w="9525">
+              <a14:hiddenLine xmlns="" xmlns:a14="http://schemas.microsoft.com/office/drawing/2010/main" w="9525">
                 <a:solidFill>
                   <a:schemeClr val="tx1"/>
                 </a:solidFill>
@@ -11514,7 +11510,7 @@
               </a14:hiddenLine>
             </a:ext>
             <a:ext uri="{AF507438-7753-43E0-B8FC-AC1667EBCBE1}">
-              <a14:hiddenEffects xmlns:a14="http://schemas.microsoft.com/office/drawing/2010/main" xmlns="">
+              <a14:hiddenEffects xmlns="" xmlns:a14="http://schemas.microsoft.com/office/drawing/2010/main">
                 <a:effectLst>
                   <a:outerShdw dist="35921" dir="2700000" algn="ctr" rotWithShape="0">
                     <a:schemeClr val="bg2"/>
@@ -11759,14 +11755,14 @@
         <p:spPr>
           <a:extLst>
             <a:ext uri="{909E8E84-426E-40DD-AFC4-6F175D3DCCD1}">
-              <a14:hiddenFill xmlns:a14="http://schemas.microsoft.com/office/drawing/2010/main" xmlns="">
+              <a14:hiddenFill xmlns="" xmlns:a14="http://schemas.microsoft.com/office/drawing/2010/main">
                 <a:solidFill>
                   <a:schemeClr val="accent1"/>
                 </a:solidFill>
               </a14:hiddenFill>
             </a:ext>
             <a:ext uri="{91240B29-F687-4F45-9708-019B960494DF}">
-              <a14:hiddenLine xmlns:a14="http://schemas.microsoft.com/office/drawing/2010/main" xmlns="" w="9525">
+              <a14:hiddenLine xmlns="" xmlns:a14="http://schemas.microsoft.com/office/drawing/2010/main" w="9525">
                 <a:solidFill>
                   <a:schemeClr val="tx1"/>
                 </a:solidFill>
@@ -11776,7 +11772,7 @@
               </a14:hiddenLine>
             </a:ext>
             <a:ext uri="{AF507438-7753-43E0-B8FC-AC1667EBCBE1}">
-              <a14:hiddenEffects xmlns:a14="http://schemas.microsoft.com/office/drawing/2010/main" xmlns="">
+              <a14:hiddenEffects xmlns="" xmlns:a14="http://schemas.microsoft.com/office/drawing/2010/main">
                 <a:effectLst>
                   <a:outerShdw dist="35921" dir="2700000" algn="ctr" rotWithShape="0">
                     <a:schemeClr val="bg2"/>
@@ -12266,14 +12262,14 @@
         <p:spPr>
           <a:extLst>
             <a:ext uri="{909E8E84-426E-40DD-AFC4-6F175D3DCCD1}">
-              <a14:hiddenFill xmlns:a14="http://schemas.microsoft.com/office/drawing/2010/main" xmlns="">
+              <a14:hiddenFill xmlns="" xmlns:a14="http://schemas.microsoft.com/office/drawing/2010/main">
                 <a:solidFill>
                   <a:schemeClr val="accent1"/>
                 </a:solidFill>
               </a14:hiddenFill>
             </a:ext>
             <a:ext uri="{91240B29-F687-4F45-9708-019B960494DF}">
-              <a14:hiddenLine xmlns:a14="http://schemas.microsoft.com/office/drawing/2010/main" xmlns="" w="9525">
+              <a14:hiddenLine xmlns="" xmlns:a14="http://schemas.microsoft.com/office/drawing/2010/main" w="9525">
                 <a:solidFill>
                   <a:schemeClr val="tx1"/>
                 </a:solidFill>
@@ -12283,7 +12279,7 @@
               </a14:hiddenLine>
             </a:ext>
             <a:ext uri="{AF507438-7753-43E0-B8FC-AC1667EBCBE1}">
-              <a14:hiddenEffects xmlns:a14="http://schemas.microsoft.com/office/drawing/2010/main" xmlns="">
+              <a14:hiddenEffects xmlns="" xmlns:a14="http://schemas.microsoft.com/office/drawing/2010/main">
                 <a:effectLst>
                   <a:outerShdw dist="35921" dir="2700000" algn="ctr" rotWithShape="0">
                     <a:schemeClr val="bg2"/>
@@ -12369,7 +12365,6 @@
               <a:rPr lang="en-US" sz="3600" dirty="0" smtClean="0"/>
               <a:t>Level 2 - DDR Arbitration Algorithm (1)</a:t>
             </a:r>
-            <a:endParaRPr lang="en-US" sz="3600" dirty="0" smtClean="0"/>
           </a:p>
         </p:txBody>
       </p:sp>
@@ -12386,14 +12381,14 @@
         <p:spPr>
           <a:extLst>
             <a:ext uri="{909E8E84-426E-40DD-AFC4-6F175D3DCCD1}">
-              <a14:hiddenFill xmlns="" xmlns:a14="http://schemas.microsoft.com/office/drawing/2010/main">
+              <a14:hiddenFill xmlns:a14="http://schemas.microsoft.com/office/drawing/2010/main" xmlns="">
                 <a:solidFill>
                   <a:schemeClr val="accent1"/>
                 </a:solidFill>
               </a14:hiddenFill>
             </a:ext>
             <a:ext uri="{91240B29-F687-4F45-9708-019B960494DF}">
-              <a14:hiddenLine xmlns="" xmlns:a14="http://schemas.microsoft.com/office/drawing/2010/main" w="9525">
+              <a14:hiddenLine xmlns:a14="http://schemas.microsoft.com/office/drawing/2010/main" xmlns="" w="9525">
                 <a:solidFill>
                   <a:schemeClr val="tx1"/>
                 </a:solidFill>
@@ -12403,7 +12398,7 @@
               </a14:hiddenLine>
             </a:ext>
             <a:ext uri="{AF507438-7753-43E0-B8FC-AC1667EBCBE1}">
-              <a14:hiddenEffects xmlns="" xmlns:a14="http://schemas.microsoft.com/office/drawing/2010/main">
+              <a14:hiddenEffects xmlns:a14="http://schemas.microsoft.com/office/drawing/2010/main" xmlns="">
                 <a:effectLst>
                   <a:outerShdw dist="35921" dir="2700000" algn="ctr" rotWithShape="0">
                     <a:schemeClr val="bg2"/>
@@ -12521,7 +12516,6 @@
               <a:rPr lang="en-US" sz="3600" dirty="0" smtClean="0"/>
               <a:t>DDR Arbitration Algorithm (2)</a:t>
             </a:r>
-            <a:endParaRPr lang="en-US" sz="3600" dirty="0" smtClean="0"/>
           </a:p>
         </p:txBody>
       </p:sp>
@@ -12612,14 +12606,14 @@
         <p:spPr>
           <a:extLst>
             <a:ext uri="{909E8E84-426E-40DD-AFC4-6F175D3DCCD1}">
-              <a14:hiddenFill xmlns="" xmlns:a14="http://schemas.microsoft.com/office/drawing/2010/main">
+              <a14:hiddenFill xmlns:a14="http://schemas.microsoft.com/office/drawing/2010/main" xmlns="">
                 <a:solidFill>
                   <a:schemeClr val="accent1"/>
                 </a:solidFill>
               </a14:hiddenFill>
             </a:ext>
             <a:ext uri="{91240B29-F687-4F45-9708-019B960494DF}">
-              <a14:hiddenLine xmlns="" xmlns:a14="http://schemas.microsoft.com/office/drawing/2010/main" w="9525">
+              <a14:hiddenLine xmlns:a14="http://schemas.microsoft.com/office/drawing/2010/main" xmlns="" w="9525">
                 <a:solidFill>
                   <a:schemeClr val="tx1"/>
                 </a:solidFill>
@@ -12629,7 +12623,7 @@
               </a14:hiddenLine>
             </a:ext>
             <a:ext uri="{AF507438-7753-43E0-B8FC-AC1667EBCBE1}">
-              <a14:hiddenEffects xmlns="" xmlns:a14="http://schemas.microsoft.com/office/drawing/2010/main">
+              <a14:hiddenEffects xmlns:a14="http://schemas.microsoft.com/office/drawing/2010/main" xmlns="">
                 <a:effectLst>
                   <a:outerShdw dist="35921" dir="2700000" algn="ctr" rotWithShape="0">
                     <a:schemeClr val="bg2"/>
@@ -12715,7 +12709,6 @@
               <a:rPr lang="en-US" sz="3600" dirty="0" smtClean="0"/>
               <a:t>DDR Arbitration Algorithm (3)</a:t>
             </a:r>
-            <a:endParaRPr lang="en-US" sz="3600" dirty="0" smtClean="0"/>
           </a:p>
         </p:txBody>
       </p:sp>
@@ -12824,14 +12817,14 @@
         <p:spPr>
           <a:extLst>
             <a:ext uri="{909E8E84-426E-40DD-AFC4-6F175D3DCCD1}">
-              <a14:hiddenFill xmlns="" xmlns:a14="http://schemas.microsoft.com/office/drawing/2010/main">
+              <a14:hiddenFill xmlns:a14="http://schemas.microsoft.com/office/drawing/2010/main" xmlns="">
                 <a:solidFill>
                   <a:schemeClr val="accent1"/>
                 </a:solidFill>
               </a14:hiddenFill>
             </a:ext>
             <a:ext uri="{91240B29-F687-4F45-9708-019B960494DF}">
-              <a14:hiddenLine xmlns="" xmlns:a14="http://schemas.microsoft.com/office/drawing/2010/main" w="9525">
+              <a14:hiddenLine xmlns:a14="http://schemas.microsoft.com/office/drawing/2010/main" xmlns="" w="9525">
                 <a:solidFill>
                   <a:schemeClr val="tx1"/>
                 </a:solidFill>
@@ -12841,7 +12834,7 @@
               </a14:hiddenLine>
             </a:ext>
             <a:ext uri="{AF507438-7753-43E0-B8FC-AC1667EBCBE1}">
-              <a14:hiddenEffects xmlns="" xmlns:a14="http://schemas.microsoft.com/office/drawing/2010/main">
+              <a14:hiddenEffects xmlns:a14="http://schemas.microsoft.com/office/drawing/2010/main" xmlns="">
                 <a:effectLst>
                   <a:outerShdw dist="35921" dir="2700000" algn="ctr" rotWithShape="0">
                     <a:schemeClr val="bg2"/>
@@ -13106,7 +13099,6 @@
               <a:rPr lang="en-US" sz="3600" dirty="0" smtClean="0"/>
               <a:t>DDR Arbitration Algorithm (4)</a:t>
             </a:r>
-            <a:endParaRPr lang="en-US" sz="3600" dirty="0" smtClean="0"/>
           </a:p>
         </p:txBody>
       </p:sp>
@@ -13202,14 +13194,14 @@
         <p:spPr>
           <a:extLst>
             <a:ext uri="{909E8E84-426E-40DD-AFC4-6F175D3DCCD1}">
-              <a14:hiddenFill xmlns="" xmlns:a14="http://schemas.microsoft.com/office/drawing/2010/main">
+              <a14:hiddenFill xmlns:a14="http://schemas.microsoft.com/office/drawing/2010/main" xmlns="">
                 <a:solidFill>
                   <a:schemeClr val="accent1"/>
                 </a:solidFill>
               </a14:hiddenFill>
             </a:ext>
             <a:ext uri="{91240B29-F687-4F45-9708-019B960494DF}">
-              <a14:hiddenLine xmlns="" xmlns:a14="http://schemas.microsoft.com/office/drawing/2010/main" w="9525">
+              <a14:hiddenLine xmlns:a14="http://schemas.microsoft.com/office/drawing/2010/main" xmlns="" w="9525">
                 <a:solidFill>
                   <a:schemeClr val="tx1"/>
                 </a:solidFill>
@@ -13219,7 +13211,7 @@
               </a14:hiddenLine>
             </a:ext>
             <a:ext uri="{AF507438-7753-43E0-B8FC-AC1667EBCBE1}">
-              <a14:hiddenEffects xmlns="" xmlns:a14="http://schemas.microsoft.com/office/drawing/2010/main">
+              <a14:hiddenEffects xmlns:a14="http://schemas.microsoft.com/office/drawing/2010/main" xmlns="">
                 <a:effectLst>
                   <a:outerShdw dist="35921" dir="2700000" algn="ctr" rotWithShape="0">
                     <a:schemeClr val="bg2"/>
@@ -13312,7 +13304,6 @@
               <a:rPr lang="en-US" sz="3600" dirty="0" smtClean="0"/>
               <a:t>Class of Service</a:t>
             </a:r>
-            <a:endParaRPr lang="en-US" sz="3600" dirty="0" smtClean="0"/>
           </a:p>
         </p:txBody>
       </p:sp>
@@ -13426,14 +13417,14 @@
         <p:spPr>
           <a:extLst>
             <a:ext uri="{909E8E84-426E-40DD-AFC4-6F175D3DCCD1}">
-              <a14:hiddenFill xmlns="" xmlns:a14="http://schemas.microsoft.com/office/drawing/2010/main">
+              <a14:hiddenFill xmlns:a14="http://schemas.microsoft.com/office/drawing/2010/main" xmlns="">
                 <a:solidFill>
                   <a:schemeClr val="accent1"/>
                 </a:solidFill>
               </a14:hiddenFill>
             </a:ext>
             <a:ext uri="{91240B29-F687-4F45-9708-019B960494DF}">
-              <a14:hiddenLine xmlns="" xmlns:a14="http://schemas.microsoft.com/office/drawing/2010/main" w="9525">
+              <a14:hiddenLine xmlns:a14="http://schemas.microsoft.com/office/drawing/2010/main" xmlns="" w="9525">
                 <a:solidFill>
                   <a:schemeClr val="tx1"/>
                 </a:solidFill>
@@ -13443,7 +13434,7 @@
               </a14:hiddenLine>
             </a:ext>
             <a:ext uri="{AF507438-7753-43E0-B8FC-AC1667EBCBE1}">
-              <a14:hiddenEffects xmlns="" xmlns:a14="http://schemas.microsoft.com/office/drawing/2010/main">
+              <a14:hiddenEffects xmlns:a14="http://schemas.microsoft.com/office/drawing/2010/main" xmlns="">
                 <a:effectLst>
                   <a:outerShdw dist="35921" dir="2700000" algn="ctr" rotWithShape="0">
                     <a:schemeClr val="bg2"/>
@@ -13624,14 +13615,14 @@
         <p:spPr>
           <a:extLst>
             <a:ext uri="{909E8E84-426E-40DD-AFC4-6F175D3DCCD1}">
-              <a14:hiddenFill xmlns="" xmlns:a14="http://schemas.microsoft.com/office/drawing/2010/main">
+              <a14:hiddenFill xmlns:a14="http://schemas.microsoft.com/office/drawing/2010/main" xmlns="">
                 <a:solidFill>
                   <a:schemeClr val="accent1"/>
                 </a:solidFill>
               </a14:hiddenFill>
             </a:ext>
             <a:ext uri="{91240B29-F687-4F45-9708-019B960494DF}">
-              <a14:hiddenLine xmlns="" xmlns:a14="http://schemas.microsoft.com/office/drawing/2010/main" w="9525">
+              <a14:hiddenLine xmlns:a14="http://schemas.microsoft.com/office/drawing/2010/main" xmlns="" w="9525">
                 <a:solidFill>
                   <a:schemeClr val="tx1"/>
                 </a:solidFill>
@@ -13641,7 +13632,7 @@
               </a14:hiddenLine>
             </a:ext>
             <a:ext uri="{AF507438-7753-43E0-B8FC-AC1667EBCBE1}">
-              <a14:hiddenEffects xmlns="" xmlns:a14="http://schemas.microsoft.com/office/drawing/2010/main">
+              <a14:hiddenEffects xmlns:a14="http://schemas.microsoft.com/office/drawing/2010/main" xmlns="">
                 <a:effectLst>
                   <a:outerShdw dist="35921" dir="2700000" algn="ctr" rotWithShape="0">
                     <a:schemeClr val="bg2"/>
@@ -13831,14 +13822,14 @@
         <p:spPr>
           <a:extLst>
             <a:ext uri="{909E8E84-426E-40DD-AFC4-6F175D3DCCD1}">
-              <a14:hiddenFill xmlns="" xmlns:a14="http://schemas.microsoft.com/office/drawing/2010/main">
+              <a14:hiddenFill xmlns:a14="http://schemas.microsoft.com/office/drawing/2010/main" xmlns="">
                 <a:solidFill>
                   <a:schemeClr val="accent1"/>
                 </a:solidFill>
               </a14:hiddenFill>
             </a:ext>
             <a:ext uri="{91240B29-F687-4F45-9708-019B960494DF}">
-              <a14:hiddenLine xmlns="" xmlns:a14="http://schemas.microsoft.com/office/drawing/2010/main" w="9525">
+              <a14:hiddenLine xmlns:a14="http://schemas.microsoft.com/office/drawing/2010/main" xmlns="" w="9525">
                 <a:solidFill>
                   <a:schemeClr val="tx1"/>
                 </a:solidFill>
@@ -13848,7 +13839,7 @@
               </a14:hiddenLine>
             </a:ext>
             <a:ext uri="{AF507438-7753-43E0-B8FC-AC1667EBCBE1}">
-              <a14:hiddenEffects xmlns="" xmlns:a14="http://schemas.microsoft.com/office/drawing/2010/main">
+              <a14:hiddenEffects xmlns:a14="http://schemas.microsoft.com/office/drawing/2010/main" xmlns="">
                 <a:effectLst>
                   <a:outerShdw dist="35921" dir="2700000" algn="ctr" rotWithShape="0">
                     <a:schemeClr val="bg2"/>
@@ -14134,14 +14125,14 @@
         <p:spPr>
           <a:extLst>
             <a:ext uri="{909E8E84-426E-40DD-AFC4-6F175D3DCCD1}">
-              <a14:hiddenFill xmlns="" xmlns:a14="http://schemas.microsoft.com/office/drawing/2010/main">
+              <a14:hiddenFill xmlns:a14="http://schemas.microsoft.com/office/drawing/2010/main" xmlns="">
                 <a:solidFill>
                   <a:schemeClr val="accent1"/>
                 </a:solidFill>
               </a14:hiddenFill>
             </a:ext>
             <a:ext uri="{91240B29-F687-4F45-9708-019B960494DF}">
-              <a14:hiddenLine xmlns="" xmlns:a14="http://schemas.microsoft.com/office/drawing/2010/main" w="9525">
+              <a14:hiddenLine xmlns:a14="http://schemas.microsoft.com/office/drawing/2010/main" xmlns="" w="9525">
                 <a:solidFill>
                   <a:schemeClr val="tx1"/>
                 </a:solidFill>
@@ -14151,7 +14142,7 @@
               </a14:hiddenLine>
             </a:ext>
             <a:ext uri="{AF507438-7753-43E0-B8FC-AC1667EBCBE1}">
-              <a14:hiddenEffects xmlns="" xmlns:a14="http://schemas.microsoft.com/office/drawing/2010/main">
+              <a14:hiddenEffects xmlns:a14="http://schemas.microsoft.com/office/drawing/2010/main" xmlns="">
                 <a:effectLst>
                   <a:outerShdw dist="35921" dir="2700000" algn="ctr" rotWithShape="0">
                     <a:schemeClr val="bg2"/>
@@ -14253,14 +14244,14 @@
         <p:spPr>
           <a:extLst>
             <a:ext uri="{909E8E84-426E-40DD-AFC4-6F175D3DCCD1}">
-              <a14:hiddenFill xmlns="" xmlns:a14="http://schemas.microsoft.com/office/drawing/2010/main">
+              <a14:hiddenFill xmlns:a14="http://schemas.microsoft.com/office/drawing/2010/main" xmlns="">
                 <a:solidFill>
                   <a:schemeClr val="accent1"/>
                 </a:solidFill>
               </a14:hiddenFill>
             </a:ext>
             <a:ext uri="{91240B29-F687-4F45-9708-019B960494DF}">
-              <a14:hiddenLine xmlns="" xmlns:a14="http://schemas.microsoft.com/office/drawing/2010/main" w="9525">
+              <a14:hiddenLine xmlns:a14="http://schemas.microsoft.com/office/drawing/2010/main" xmlns="" w="9525">
                 <a:solidFill>
                   <a:schemeClr val="tx1"/>
                 </a:solidFill>
@@ -14270,7 +14261,7 @@
               </a14:hiddenLine>
             </a:ext>
             <a:ext uri="{AF507438-7753-43E0-B8FC-AC1667EBCBE1}">
-              <a14:hiddenEffects xmlns="" xmlns:a14="http://schemas.microsoft.com/office/drawing/2010/main">
+              <a14:hiddenEffects xmlns:a14="http://schemas.microsoft.com/office/drawing/2010/main" xmlns="">
                 <a:effectLst>
                   <a:outerShdw dist="35921" dir="2700000" algn="ctr" rotWithShape="0">
                     <a:schemeClr val="bg2"/>
@@ -14590,14 +14581,14 @@
         <p:spPr>
           <a:extLst>
             <a:ext uri="{909E8E84-426E-40DD-AFC4-6F175D3DCCD1}">
-              <a14:hiddenFill xmlns="" xmlns:a14="http://schemas.microsoft.com/office/drawing/2010/main">
+              <a14:hiddenFill xmlns:a14="http://schemas.microsoft.com/office/drawing/2010/main" xmlns="">
                 <a:solidFill>
                   <a:schemeClr val="accent1"/>
                 </a:solidFill>
               </a14:hiddenFill>
             </a:ext>
             <a:ext uri="{91240B29-F687-4F45-9708-019B960494DF}">
-              <a14:hiddenLine xmlns="" xmlns:a14="http://schemas.microsoft.com/office/drawing/2010/main" w="9525">
+              <a14:hiddenLine xmlns:a14="http://schemas.microsoft.com/office/drawing/2010/main" xmlns="" w="9525">
                 <a:solidFill>
                   <a:schemeClr val="tx1"/>
                 </a:solidFill>
@@ -14607,7 +14598,7 @@
               </a14:hiddenLine>
             </a:ext>
             <a:ext uri="{AF507438-7753-43E0-B8FC-AC1667EBCBE1}">
-              <a14:hiddenEffects xmlns="" xmlns:a14="http://schemas.microsoft.com/office/drawing/2010/main">
+              <a14:hiddenEffects xmlns:a14="http://schemas.microsoft.com/office/drawing/2010/main" xmlns="">
                 <a:effectLst>
                   <a:outerShdw dist="35921" dir="2700000" algn="ctr" rotWithShape="0">
                     <a:schemeClr val="bg2"/>
@@ -14709,14 +14700,14 @@
         <p:spPr>
           <a:extLst>
             <a:ext uri="{909E8E84-426E-40DD-AFC4-6F175D3DCCD1}">
-              <a14:hiddenFill xmlns="" xmlns:a14="http://schemas.microsoft.com/office/drawing/2010/main">
+              <a14:hiddenFill xmlns:a14="http://schemas.microsoft.com/office/drawing/2010/main" xmlns="">
                 <a:solidFill>
                   <a:schemeClr val="accent1"/>
                 </a:solidFill>
               </a14:hiddenFill>
             </a:ext>
             <a:ext uri="{91240B29-F687-4F45-9708-019B960494DF}">
-              <a14:hiddenLine xmlns="" xmlns:a14="http://schemas.microsoft.com/office/drawing/2010/main" w="9525">
+              <a14:hiddenLine xmlns:a14="http://schemas.microsoft.com/office/drawing/2010/main" xmlns="" w="9525">
                 <a:solidFill>
                   <a:schemeClr val="tx1"/>
                 </a:solidFill>
@@ -14726,7 +14717,7 @@
               </a14:hiddenLine>
             </a:ext>
             <a:ext uri="{AF507438-7753-43E0-B8FC-AC1667EBCBE1}">
-              <a14:hiddenEffects xmlns="" xmlns:a14="http://schemas.microsoft.com/office/drawing/2010/main">
+              <a14:hiddenEffects xmlns:a14="http://schemas.microsoft.com/office/drawing/2010/main" xmlns="">
                 <a:effectLst>
                   <a:outerShdw dist="35921" dir="2700000" algn="ctr" rotWithShape="0">
                     <a:schemeClr val="bg2"/>
@@ -14830,17 +14821,8 @@
           <a:p>
             <a:r>
               <a:rPr lang="en-US" sz="3600" dirty="0" smtClean="0"/>
-              <a:t>Bus Priority </a:t>
-            </a:r>
-            <a:r>
-              <a:rPr lang="en-US" sz="3600" dirty="0" smtClean="0"/>
-              <a:t>of Other </a:t>
-            </a:r>
-            <a:r>
-              <a:rPr lang="en-US" sz="3600" dirty="0" smtClean="0"/>
-              <a:t>Masters </a:t>
-            </a:r>
-            <a:endParaRPr lang="en-US" sz="3600" dirty="0" smtClean="0"/>
+              <a:t>Bus Priority of Other Masters </a:t>
+            </a:r>
           </a:p>
         </p:txBody>
       </p:sp>
@@ -14945,14 +14927,14 @@
         <p:spPr>
           <a:extLst>
             <a:ext uri="{909E8E84-426E-40DD-AFC4-6F175D3DCCD1}">
-              <a14:hiddenFill xmlns="" xmlns:a14="http://schemas.microsoft.com/office/drawing/2010/main">
+              <a14:hiddenFill xmlns:a14="http://schemas.microsoft.com/office/drawing/2010/main" xmlns="">
                 <a:solidFill>
                   <a:schemeClr val="accent1"/>
                 </a:solidFill>
               </a14:hiddenFill>
             </a:ext>
             <a:ext uri="{91240B29-F687-4F45-9708-019B960494DF}">
-              <a14:hiddenLine xmlns="" xmlns:a14="http://schemas.microsoft.com/office/drawing/2010/main" w="9525">
+              <a14:hiddenLine xmlns:a14="http://schemas.microsoft.com/office/drawing/2010/main" xmlns="" w="9525">
                 <a:solidFill>
                   <a:schemeClr val="tx1"/>
                 </a:solidFill>
@@ -14962,7 +14944,7 @@
               </a14:hiddenLine>
             </a:ext>
             <a:ext uri="{AF507438-7753-43E0-B8FC-AC1667EBCBE1}">
-              <a14:hiddenEffects xmlns="" xmlns:a14="http://schemas.microsoft.com/office/drawing/2010/main">
+              <a14:hiddenEffects xmlns:a14="http://schemas.microsoft.com/office/drawing/2010/main" xmlns="">
                 <a:effectLst>
                   <a:outerShdw dist="35921" dir="2700000" algn="ctr" rotWithShape="0">
                     <a:schemeClr val="bg2"/>

</xml_diff>